<commit_message>
Edit 03.Blockchain-Ethereum, Smart Contracts Introduction-Presentation.pptx
</commit_message>
<xml_diff>
--- a/03.Ethereum, Smart Contracts/03.Blockchain-Ethereum, Smart Contracts Introduction-Presentation.pptx
+++ b/03.Ethereum, Smart Contracts/03.Blockchain-Ethereum, Smart Contracts Introduction-Presentation.pptx
@@ -3231,6 +3231,44 @@
           </a:xfrm>
         </p:spPr>
       </p:pic>
+      <p:sp>
+        <p:nvSpPr>
+          <p:cNvPr id="3" name="TextBox 2"/>
+          <p:cNvSpPr txBox="1"/>
+          <p:nvPr/>
+        </p:nvSpPr>
+        <p:spPr>
+          <a:xfrm>
+            <a:off x="1228437" y="5966690"/>
+            <a:ext cx="10852727" cy="307777"/>
+          </a:xfrm>
+          <a:prstGeom prst="rect">
+            <a:avLst/>
+          </a:prstGeom>
+          <a:noFill/>
+        </p:spPr>
+        <p:txBody>
+          <a:bodyPr wrap="square" rtlCol="0">
+            <a:spAutoFit/>
+          </a:bodyPr>
+          <a:lstStyle/>
+          <a:p>
+            <a:r>
+              <a:rPr lang="en-GB" sz="1400" dirty="0">
+                <a:hlinkClick r:id="rId3"/>
+              </a:rPr>
+              <a:t>https://</a:t>
+            </a:r>
+            <a:r>
+              <a:rPr lang="en-GB" sz="1400" dirty="0" smtClean="0">
+                <a:hlinkClick r:id="rId3"/>
+              </a:rPr>
+              <a:t>github.com/mdamyanova/Blockchain-Basics-Mini-Course/blob/master/03.Ethereum%2C%20Smart%20Contracts/Demo/Cat.sol</a:t>
+            </a:r>
+            <a:endParaRPr lang="en-GB" dirty="0"/>
+          </a:p>
+        </p:txBody>
+      </p:sp>
     </p:spTree>
     <p:extLst>
       <p:ext uri="{BB962C8B-B14F-4D97-AF65-F5344CB8AC3E}">
@@ -3241,6 +3279,95 @@
   <p:clrMapOvr>
     <a:masterClrMapping/>
   </p:clrMapOvr>
+  <p:timing>
+    <p:tnLst>
+      <p:par>
+        <p:cTn id="1" dur="indefinite" restart="never" nodeType="tmRoot">
+          <p:childTnLst>
+            <p:seq concurrent="1" nextAc="seek">
+              <p:cTn id="2" dur="indefinite" nodeType="mainSeq">
+                <p:childTnLst>
+                  <p:par>
+                    <p:cTn id="3" fill="hold">
+                      <p:stCondLst>
+                        <p:cond delay="indefinite"/>
+                        <p:cond evt="onBegin" delay="0">
+                          <p:tn val="2"/>
+                        </p:cond>
+                      </p:stCondLst>
+                      <p:childTnLst>
+                        <p:par>
+                          <p:cTn id="4" fill="hold">
+                            <p:stCondLst>
+                              <p:cond delay="0"/>
+                            </p:stCondLst>
+                            <p:childTnLst>
+                              <p:par>
+                                <p:cTn id="5" presetID="10" presetClass="entr" presetSubtype="0" fill="hold" grpId="0" nodeType="withEffect">
+                                  <p:stCondLst>
+                                    <p:cond delay="0"/>
+                                  </p:stCondLst>
+                                  <p:childTnLst>
+                                    <p:set>
+                                      <p:cBhvr>
+                                        <p:cTn id="6" dur="1" fill="hold">
+                                          <p:stCondLst>
+                                            <p:cond delay="0"/>
+                                          </p:stCondLst>
+                                        </p:cTn>
+                                        <p:tgtEl>
+                                          <p:spTgt spid="3"/>
+                                        </p:tgtEl>
+                                        <p:attrNameLst>
+                                          <p:attrName>style.visibility</p:attrName>
+                                        </p:attrNameLst>
+                                      </p:cBhvr>
+                                      <p:to>
+                                        <p:strVal val="visible"/>
+                                      </p:to>
+                                    </p:set>
+                                    <p:animEffect transition="in" filter="fade">
+                                      <p:cBhvr>
+                                        <p:cTn id="7" dur="500"/>
+                                        <p:tgtEl>
+                                          <p:spTgt spid="3"/>
+                                        </p:tgtEl>
+                                      </p:cBhvr>
+                                    </p:animEffect>
+                                  </p:childTnLst>
+                                </p:cTn>
+                              </p:par>
+                            </p:childTnLst>
+                          </p:cTn>
+                        </p:par>
+                      </p:childTnLst>
+                    </p:cTn>
+                  </p:par>
+                </p:childTnLst>
+              </p:cTn>
+              <p:prevCondLst>
+                <p:cond evt="onPrev" delay="0">
+                  <p:tgtEl>
+                    <p:sldTgt/>
+                  </p:tgtEl>
+                </p:cond>
+              </p:prevCondLst>
+              <p:nextCondLst>
+                <p:cond evt="onNext" delay="0">
+                  <p:tgtEl>
+                    <p:sldTgt/>
+                  </p:tgtEl>
+                </p:cond>
+              </p:nextCondLst>
+            </p:seq>
+          </p:childTnLst>
+        </p:cTn>
+      </p:par>
+    </p:tnLst>
+    <p:bldLst>
+      <p:bldP spid="3" grpId="0"/>
+    </p:bldLst>
+  </p:timing>
 </p:sld>
 </file>
 
@@ -3461,7 +3588,7 @@
         <p:spPr>
           <a:xfrm>
             <a:off x="969818" y="1902691"/>
-            <a:ext cx="6428509" cy="1384995"/>
+            <a:ext cx="7755082" cy="2923877"/>
           </a:xfrm>
           <a:prstGeom prst="rect">
             <a:avLst/>
@@ -3479,7 +3606,7 @@
               <a:buChar char="§"/>
             </a:pPr>
             <a:r>
-              <a:rPr lang="en-GB" sz="2800" b="1" dirty="0" smtClean="0">
+              <a:rPr lang="en-GB" sz="2800" b="1" dirty="0" err="1" smtClean="0">
                 <a:solidFill>
                   <a:schemeClr val="accent1">
                     <a:lumMod val="50000"/>
@@ -3488,6 +3615,76 @@
               </a:rPr>
               <a:t>Ethereum</a:t>
             </a:r>
+            <a:endParaRPr lang="en-GB" sz="2800" b="1" dirty="0" smtClean="0">
+              <a:solidFill>
+                <a:schemeClr val="accent1">
+                  <a:lumMod val="50000"/>
+                </a:schemeClr>
+              </a:solidFill>
+            </a:endParaRPr>
+          </a:p>
+          <a:p>
+            <a:pPr marL="914400" lvl="1" indent="-457200">
+              <a:buFont typeface="Wingdings" panose="05000000000000000000" pitchFamily="2" charset="2"/>
+              <a:buChar char="§"/>
+            </a:pPr>
+            <a:r>
+              <a:rPr lang="en-GB" sz="2400" b="1" dirty="0">
+                <a:solidFill>
+                  <a:schemeClr val="accent1">
+                    <a:lumMod val="50000"/>
+                  </a:schemeClr>
+                </a:solidFill>
+              </a:rPr>
+              <a:t>Open software platform </a:t>
+            </a:r>
+            <a:r>
+              <a:rPr lang="en-GB" sz="2400" dirty="0">
+                <a:solidFill>
+                  <a:schemeClr val="accent1">
+                    <a:lumMod val="50000"/>
+                  </a:schemeClr>
+                </a:solidFill>
+              </a:rPr>
+              <a:t>based upon </a:t>
+            </a:r>
+            <a:r>
+              <a:rPr lang="en-GB" sz="2400" b="1" dirty="0" err="1">
+                <a:solidFill>
+                  <a:schemeClr val="accent1">
+                    <a:lumMod val="50000"/>
+                  </a:schemeClr>
+                </a:solidFill>
+              </a:rPr>
+              <a:t>Blockchain</a:t>
+            </a:r>
+            <a:r>
+              <a:rPr lang="en-GB" sz="2400" dirty="0">
+                <a:solidFill>
+                  <a:schemeClr val="accent1">
+                    <a:lumMod val="50000"/>
+                  </a:schemeClr>
+                </a:solidFill>
+              </a:rPr>
+              <a:t> </a:t>
+            </a:r>
+            <a:r>
+              <a:rPr lang="en-GB" sz="2400" dirty="0" smtClean="0">
+                <a:solidFill>
+                  <a:schemeClr val="accent1">
+                    <a:lumMod val="50000"/>
+                  </a:schemeClr>
+                </a:solidFill>
+              </a:rPr>
+              <a:t>technology for creating apps</a:t>
+            </a:r>
+            <a:endParaRPr lang="en-GB" sz="2400" b="1" dirty="0" smtClean="0">
+              <a:solidFill>
+                <a:schemeClr val="accent1">
+                  <a:lumMod val="50000"/>
+                </a:schemeClr>
+              </a:solidFill>
+            </a:endParaRPr>
           </a:p>
           <a:p>
             <a:pPr marL="457200" indent="-457200">
@@ -3502,8 +3699,61 @@
                   </a:schemeClr>
                 </a:solidFill>
               </a:rPr>
-              <a:t>Smart Contracts</a:t>
-            </a:r>
+              <a:t>Smart </a:t>
+            </a:r>
+            <a:r>
+              <a:rPr lang="en-GB" sz="2800" b="1" dirty="0" smtClean="0">
+                <a:solidFill>
+                  <a:schemeClr val="accent1">
+                    <a:lumMod val="50000"/>
+                  </a:schemeClr>
+                </a:solidFill>
+              </a:rPr>
+              <a:t>Contracts</a:t>
+            </a:r>
+          </a:p>
+          <a:p>
+            <a:pPr marL="914400" lvl="1" indent="-457200">
+              <a:buFont typeface="Wingdings" panose="05000000000000000000" pitchFamily="2" charset="2"/>
+              <a:buChar char="§"/>
+            </a:pPr>
+            <a:r>
+              <a:rPr lang="en-GB" sz="2400" b="1" dirty="0" smtClean="0">
+                <a:solidFill>
+                  <a:schemeClr val="accent1">
+                    <a:lumMod val="50000"/>
+                  </a:schemeClr>
+                </a:solidFill>
+              </a:rPr>
+              <a:t>Code</a:t>
+            </a:r>
+            <a:r>
+              <a:rPr lang="en-GB" sz="2400" dirty="0" smtClean="0">
+                <a:solidFill>
+                  <a:schemeClr val="accent1">
+                    <a:lumMod val="50000"/>
+                  </a:schemeClr>
+                </a:solidFill>
+              </a:rPr>
+              <a:t> with </a:t>
+            </a:r>
+            <a:r>
+              <a:rPr lang="en-GB" sz="2400" b="1" dirty="0">
+                <a:solidFill>
+                  <a:schemeClr val="accent1">
+                    <a:lumMod val="50000"/>
+                  </a:schemeClr>
+                </a:solidFill>
+              </a:rPr>
+              <a:t>rules</a:t>
+            </a:r>
+            <a:endParaRPr lang="en-GB" sz="2400" b="1" dirty="0" smtClean="0">
+              <a:solidFill>
+                <a:schemeClr val="accent1">
+                  <a:lumMod val="50000"/>
+                </a:schemeClr>
+              </a:solidFill>
+            </a:endParaRPr>
           </a:p>
           <a:p>
             <a:pPr marL="457200" indent="-457200">
@@ -3520,7 +3770,33 @@
               </a:rPr>
               <a:t>Solidity</a:t>
             </a:r>
-            <a:endParaRPr lang="en-GB" sz="2800" b="1" dirty="0">
+          </a:p>
+          <a:p>
+            <a:pPr marL="914400" lvl="1" indent="-457200">
+              <a:buFont typeface="Wingdings" panose="05000000000000000000" pitchFamily="2" charset="2"/>
+              <a:buChar char="§"/>
+            </a:pPr>
+            <a:r>
+              <a:rPr lang="en-GB" sz="2400" b="1" dirty="0" smtClean="0">
+                <a:solidFill>
+                  <a:schemeClr val="accent1">
+                    <a:lumMod val="50000"/>
+                  </a:schemeClr>
+                </a:solidFill>
+              </a:rPr>
+              <a:t>Programming language </a:t>
+            </a:r>
+            <a:r>
+              <a:rPr lang="en-GB" sz="2400" dirty="0" smtClean="0">
+                <a:solidFill>
+                  <a:schemeClr val="accent1">
+                    <a:lumMod val="50000"/>
+                  </a:schemeClr>
+                </a:solidFill>
+              </a:rPr>
+              <a:t>for writing smart contracts</a:t>
+            </a:r>
+            <a:endParaRPr lang="en-GB" sz="2400" dirty="0">
               <a:solidFill>
                 <a:schemeClr val="accent1">
                   <a:lumMod val="50000"/>
@@ -3543,7 +3819,399 @@
   <p:timing>
     <p:tnLst>
       <p:par>
-        <p:cTn id="1" dur="indefinite" restart="never" nodeType="tmRoot"/>
+        <p:cTn id="1" dur="indefinite" restart="never" nodeType="tmRoot">
+          <p:childTnLst>
+            <p:seq concurrent="1" nextAc="seek">
+              <p:cTn id="2" dur="indefinite" nodeType="mainSeq">
+                <p:childTnLst>
+                  <p:par>
+                    <p:cTn id="3" fill="hold">
+                      <p:stCondLst>
+                        <p:cond delay="indefinite"/>
+                        <p:cond evt="onBegin" delay="0">
+                          <p:tn val="2"/>
+                        </p:cond>
+                      </p:stCondLst>
+                      <p:childTnLst>
+                        <p:par>
+                          <p:cTn id="4" fill="hold">
+                            <p:stCondLst>
+                              <p:cond delay="0"/>
+                            </p:stCondLst>
+                            <p:childTnLst>
+                              <p:par>
+                                <p:cTn id="5" presetID="10" presetClass="entr" presetSubtype="0" fill="hold" nodeType="withEffect">
+                                  <p:stCondLst>
+                                    <p:cond delay="0"/>
+                                  </p:stCondLst>
+                                  <p:childTnLst>
+                                    <p:set>
+                                      <p:cBhvr>
+                                        <p:cTn id="6" dur="1" fill="hold">
+                                          <p:stCondLst>
+                                            <p:cond delay="0"/>
+                                          </p:stCondLst>
+                                        </p:cTn>
+                                        <p:tgtEl>
+                                          <p:spTgt spid="3">
+                                            <p:txEl>
+                                              <p:pRg st="0" end="0"/>
+                                            </p:txEl>
+                                          </p:spTgt>
+                                        </p:tgtEl>
+                                        <p:attrNameLst>
+                                          <p:attrName>style.visibility</p:attrName>
+                                        </p:attrNameLst>
+                                      </p:cBhvr>
+                                      <p:to>
+                                        <p:strVal val="visible"/>
+                                      </p:to>
+                                    </p:set>
+                                    <p:animEffect transition="in" filter="fade">
+                                      <p:cBhvr>
+                                        <p:cTn id="7" dur="500"/>
+                                        <p:tgtEl>
+                                          <p:spTgt spid="3">
+                                            <p:txEl>
+                                              <p:pRg st="0" end="0"/>
+                                            </p:txEl>
+                                          </p:spTgt>
+                                        </p:tgtEl>
+                                      </p:cBhvr>
+                                    </p:animEffect>
+                                  </p:childTnLst>
+                                </p:cTn>
+                              </p:par>
+                            </p:childTnLst>
+                          </p:cTn>
+                        </p:par>
+                      </p:childTnLst>
+                    </p:cTn>
+                  </p:par>
+                  <p:par>
+                    <p:cTn id="8" fill="hold">
+                      <p:stCondLst>
+                        <p:cond delay="indefinite"/>
+                      </p:stCondLst>
+                      <p:childTnLst>
+                        <p:par>
+                          <p:cTn id="9" fill="hold">
+                            <p:stCondLst>
+                              <p:cond delay="0"/>
+                            </p:stCondLst>
+                            <p:childTnLst>
+                              <p:par>
+                                <p:cTn id="10" presetID="10" presetClass="entr" presetSubtype="0" fill="hold" nodeType="clickEffect">
+                                  <p:stCondLst>
+                                    <p:cond delay="0"/>
+                                  </p:stCondLst>
+                                  <p:childTnLst>
+                                    <p:set>
+                                      <p:cBhvr>
+                                        <p:cTn id="11" dur="1" fill="hold">
+                                          <p:stCondLst>
+                                            <p:cond delay="0"/>
+                                          </p:stCondLst>
+                                        </p:cTn>
+                                        <p:tgtEl>
+                                          <p:spTgt spid="3">
+                                            <p:txEl>
+                                              <p:pRg st="1" end="1"/>
+                                            </p:txEl>
+                                          </p:spTgt>
+                                        </p:tgtEl>
+                                        <p:attrNameLst>
+                                          <p:attrName>style.visibility</p:attrName>
+                                        </p:attrNameLst>
+                                      </p:cBhvr>
+                                      <p:to>
+                                        <p:strVal val="visible"/>
+                                      </p:to>
+                                    </p:set>
+                                    <p:animEffect transition="in" filter="fade">
+                                      <p:cBhvr>
+                                        <p:cTn id="12" dur="500"/>
+                                        <p:tgtEl>
+                                          <p:spTgt spid="3">
+                                            <p:txEl>
+                                              <p:pRg st="1" end="1"/>
+                                            </p:txEl>
+                                          </p:spTgt>
+                                        </p:tgtEl>
+                                      </p:cBhvr>
+                                    </p:animEffect>
+                                  </p:childTnLst>
+                                </p:cTn>
+                              </p:par>
+                            </p:childTnLst>
+                          </p:cTn>
+                        </p:par>
+                      </p:childTnLst>
+                    </p:cTn>
+                  </p:par>
+                  <p:par>
+                    <p:cTn id="13" fill="hold">
+                      <p:stCondLst>
+                        <p:cond delay="indefinite"/>
+                      </p:stCondLst>
+                      <p:childTnLst>
+                        <p:par>
+                          <p:cTn id="14" fill="hold">
+                            <p:stCondLst>
+                              <p:cond delay="0"/>
+                            </p:stCondLst>
+                            <p:childTnLst>
+                              <p:par>
+                                <p:cTn id="15" presetID="10" presetClass="entr" presetSubtype="0" fill="hold" nodeType="clickEffect">
+                                  <p:stCondLst>
+                                    <p:cond delay="0"/>
+                                  </p:stCondLst>
+                                  <p:childTnLst>
+                                    <p:set>
+                                      <p:cBhvr>
+                                        <p:cTn id="16" dur="1" fill="hold">
+                                          <p:stCondLst>
+                                            <p:cond delay="0"/>
+                                          </p:stCondLst>
+                                        </p:cTn>
+                                        <p:tgtEl>
+                                          <p:spTgt spid="3">
+                                            <p:txEl>
+                                              <p:pRg st="2" end="2"/>
+                                            </p:txEl>
+                                          </p:spTgt>
+                                        </p:tgtEl>
+                                        <p:attrNameLst>
+                                          <p:attrName>style.visibility</p:attrName>
+                                        </p:attrNameLst>
+                                      </p:cBhvr>
+                                      <p:to>
+                                        <p:strVal val="visible"/>
+                                      </p:to>
+                                    </p:set>
+                                    <p:animEffect transition="in" filter="fade">
+                                      <p:cBhvr>
+                                        <p:cTn id="17" dur="500"/>
+                                        <p:tgtEl>
+                                          <p:spTgt spid="3">
+                                            <p:txEl>
+                                              <p:pRg st="2" end="2"/>
+                                            </p:txEl>
+                                          </p:spTgt>
+                                        </p:tgtEl>
+                                      </p:cBhvr>
+                                    </p:animEffect>
+                                  </p:childTnLst>
+                                </p:cTn>
+                              </p:par>
+                            </p:childTnLst>
+                          </p:cTn>
+                        </p:par>
+                      </p:childTnLst>
+                    </p:cTn>
+                  </p:par>
+                  <p:par>
+                    <p:cTn id="18" fill="hold">
+                      <p:stCondLst>
+                        <p:cond delay="indefinite"/>
+                      </p:stCondLst>
+                      <p:childTnLst>
+                        <p:par>
+                          <p:cTn id="19" fill="hold">
+                            <p:stCondLst>
+                              <p:cond delay="0"/>
+                            </p:stCondLst>
+                            <p:childTnLst>
+                              <p:par>
+                                <p:cTn id="20" presetID="10" presetClass="entr" presetSubtype="0" fill="hold" nodeType="clickEffect">
+                                  <p:stCondLst>
+                                    <p:cond delay="0"/>
+                                  </p:stCondLst>
+                                  <p:childTnLst>
+                                    <p:set>
+                                      <p:cBhvr>
+                                        <p:cTn id="21" dur="1" fill="hold">
+                                          <p:stCondLst>
+                                            <p:cond delay="0"/>
+                                          </p:stCondLst>
+                                        </p:cTn>
+                                        <p:tgtEl>
+                                          <p:spTgt spid="3">
+                                            <p:txEl>
+                                              <p:pRg st="3" end="3"/>
+                                            </p:txEl>
+                                          </p:spTgt>
+                                        </p:tgtEl>
+                                        <p:attrNameLst>
+                                          <p:attrName>style.visibility</p:attrName>
+                                        </p:attrNameLst>
+                                      </p:cBhvr>
+                                      <p:to>
+                                        <p:strVal val="visible"/>
+                                      </p:to>
+                                    </p:set>
+                                    <p:animEffect transition="in" filter="fade">
+                                      <p:cBhvr>
+                                        <p:cTn id="22" dur="500"/>
+                                        <p:tgtEl>
+                                          <p:spTgt spid="3">
+                                            <p:txEl>
+                                              <p:pRg st="3" end="3"/>
+                                            </p:txEl>
+                                          </p:spTgt>
+                                        </p:tgtEl>
+                                      </p:cBhvr>
+                                    </p:animEffect>
+                                  </p:childTnLst>
+                                </p:cTn>
+                              </p:par>
+                            </p:childTnLst>
+                          </p:cTn>
+                        </p:par>
+                      </p:childTnLst>
+                    </p:cTn>
+                  </p:par>
+                  <p:par>
+                    <p:cTn id="23" fill="hold">
+                      <p:stCondLst>
+                        <p:cond delay="indefinite"/>
+                      </p:stCondLst>
+                      <p:childTnLst>
+                        <p:par>
+                          <p:cTn id="24" fill="hold">
+                            <p:stCondLst>
+                              <p:cond delay="0"/>
+                            </p:stCondLst>
+                            <p:childTnLst>
+                              <p:par>
+                                <p:cTn id="25" presetID="10" presetClass="entr" presetSubtype="0" fill="hold" nodeType="clickEffect">
+                                  <p:stCondLst>
+                                    <p:cond delay="0"/>
+                                  </p:stCondLst>
+                                  <p:childTnLst>
+                                    <p:set>
+                                      <p:cBhvr>
+                                        <p:cTn id="26" dur="1" fill="hold">
+                                          <p:stCondLst>
+                                            <p:cond delay="0"/>
+                                          </p:stCondLst>
+                                        </p:cTn>
+                                        <p:tgtEl>
+                                          <p:spTgt spid="3">
+                                            <p:txEl>
+                                              <p:pRg st="4" end="4"/>
+                                            </p:txEl>
+                                          </p:spTgt>
+                                        </p:tgtEl>
+                                        <p:attrNameLst>
+                                          <p:attrName>style.visibility</p:attrName>
+                                        </p:attrNameLst>
+                                      </p:cBhvr>
+                                      <p:to>
+                                        <p:strVal val="visible"/>
+                                      </p:to>
+                                    </p:set>
+                                    <p:animEffect transition="in" filter="fade">
+                                      <p:cBhvr>
+                                        <p:cTn id="27" dur="500"/>
+                                        <p:tgtEl>
+                                          <p:spTgt spid="3">
+                                            <p:txEl>
+                                              <p:pRg st="4" end="4"/>
+                                            </p:txEl>
+                                          </p:spTgt>
+                                        </p:tgtEl>
+                                      </p:cBhvr>
+                                    </p:animEffect>
+                                  </p:childTnLst>
+                                </p:cTn>
+                              </p:par>
+                            </p:childTnLst>
+                          </p:cTn>
+                        </p:par>
+                      </p:childTnLst>
+                    </p:cTn>
+                  </p:par>
+                  <p:par>
+                    <p:cTn id="28" fill="hold">
+                      <p:stCondLst>
+                        <p:cond delay="indefinite"/>
+                      </p:stCondLst>
+                      <p:childTnLst>
+                        <p:par>
+                          <p:cTn id="29" fill="hold">
+                            <p:stCondLst>
+                              <p:cond delay="0"/>
+                            </p:stCondLst>
+                            <p:childTnLst>
+                              <p:par>
+                                <p:cTn id="30" presetID="10" presetClass="entr" presetSubtype="0" fill="hold" nodeType="clickEffect">
+                                  <p:stCondLst>
+                                    <p:cond delay="0"/>
+                                  </p:stCondLst>
+                                  <p:childTnLst>
+                                    <p:set>
+                                      <p:cBhvr>
+                                        <p:cTn id="31" dur="1" fill="hold">
+                                          <p:stCondLst>
+                                            <p:cond delay="0"/>
+                                          </p:stCondLst>
+                                        </p:cTn>
+                                        <p:tgtEl>
+                                          <p:spTgt spid="3">
+                                            <p:txEl>
+                                              <p:pRg st="5" end="5"/>
+                                            </p:txEl>
+                                          </p:spTgt>
+                                        </p:tgtEl>
+                                        <p:attrNameLst>
+                                          <p:attrName>style.visibility</p:attrName>
+                                        </p:attrNameLst>
+                                      </p:cBhvr>
+                                      <p:to>
+                                        <p:strVal val="visible"/>
+                                      </p:to>
+                                    </p:set>
+                                    <p:animEffect transition="in" filter="fade">
+                                      <p:cBhvr>
+                                        <p:cTn id="32" dur="500"/>
+                                        <p:tgtEl>
+                                          <p:spTgt spid="3">
+                                            <p:txEl>
+                                              <p:pRg st="5" end="5"/>
+                                            </p:txEl>
+                                          </p:spTgt>
+                                        </p:tgtEl>
+                                      </p:cBhvr>
+                                    </p:animEffect>
+                                  </p:childTnLst>
+                                </p:cTn>
+                              </p:par>
+                            </p:childTnLst>
+                          </p:cTn>
+                        </p:par>
+                      </p:childTnLst>
+                    </p:cTn>
+                  </p:par>
+                </p:childTnLst>
+              </p:cTn>
+              <p:prevCondLst>
+                <p:cond evt="onPrev" delay="0">
+                  <p:tgtEl>
+                    <p:sldTgt/>
+                  </p:tgtEl>
+                </p:cond>
+              </p:prevCondLst>
+              <p:nextCondLst>
+                <p:cond evt="onNext" delay="0">
+                  <p:tgtEl>
+                    <p:sldTgt/>
+                  </p:tgtEl>
+                </p:cond>
+              </p:nextCondLst>
+            </p:seq>
+          </p:childTnLst>
+        </p:cTn>
       </p:par>
     </p:tnLst>
   </p:timing>
@@ -3702,7 +4370,155 @@
   <p:timing>
     <p:tnLst>
       <p:par>
-        <p:cTn id="1" dur="indefinite" restart="never" nodeType="tmRoot"/>
+        <p:cTn id="1" dur="indefinite" restart="never" nodeType="tmRoot">
+          <p:childTnLst>
+            <p:seq concurrent="1" nextAc="seek">
+              <p:cTn id="2" dur="indefinite" nodeType="mainSeq">
+                <p:childTnLst>
+                  <p:par>
+                    <p:cTn id="3" fill="hold">
+                      <p:stCondLst>
+                        <p:cond delay="indefinite"/>
+                        <p:cond evt="onBegin" delay="0">
+                          <p:tn val="2"/>
+                        </p:cond>
+                      </p:stCondLst>
+                      <p:childTnLst>
+                        <p:par>
+                          <p:cTn id="4" fill="hold">
+                            <p:stCondLst>
+                              <p:cond delay="0"/>
+                            </p:stCondLst>
+                            <p:childTnLst>
+                              <p:par>
+                                <p:cTn id="5" presetID="10" presetClass="entr" presetSubtype="0" fill="hold" nodeType="withEffect">
+                                  <p:stCondLst>
+                                    <p:cond delay="0"/>
+                                  </p:stCondLst>
+                                  <p:childTnLst>
+                                    <p:set>
+                                      <p:cBhvr>
+                                        <p:cTn id="6" dur="1" fill="hold">
+                                          <p:stCondLst>
+                                            <p:cond delay="0"/>
+                                          </p:stCondLst>
+                                        </p:cTn>
+                                        <p:tgtEl>
+                                          <p:spTgt spid="3">
+                                            <p:txEl>
+                                              <p:pRg st="0" end="0"/>
+                                            </p:txEl>
+                                          </p:spTgt>
+                                        </p:tgtEl>
+                                        <p:attrNameLst>
+                                          <p:attrName>style.visibility</p:attrName>
+                                        </p:attrNameLst>
+                                      </p:cBhvr>
+                                      <p:to>
+                                        <p:strVal val="visible"/>
+                                      </p:to>
+                                    </p:set>
+                                    <p:animEffect transition="in" filter="fade">
+                                      <p:cBhvr>
+                                        <p:cTn id="7" dur="500"/>
+                                        <p:tgtEl>
+                                          <p:spTgt spid="3">
+                                            <p:txEl>
+                                              <p:pRg st="0" end="0"/>
+                                            </p:txEl>
+                                          </p:spTgt>
+                                        </p:tgtEl>
+                                      </p:cBhvr>
+                                    </p:animEffect>
+                                  </p:childTnLst>
+                                </p:cTn>
+                              </p:par>
+                            </p:childTnLst>
+                          </p:cTn>
+                        </p:par>
+                      </p:childTnLst>
+                    </p:cTn>
+                  </p:par>
+                  <p:par>
+                    <p:cTn id="8" fill="hold">
+                      <p:stCondLst>
+                        <p:cond delay="indefinite"/>
+                      </p:stCondLst>
+                      <p:childTnLst>
+                        <p:par>
+                          <p:cTn id="9" fill="hold">
+                            <p:stCondLst>
+                              <p:cond delay="0"/>
+                            </p:stCondLst>
+                            <p:childTnLst>
+                              <p:par>
+                                <p:cTn id="10" presetID="10" presetClass="entr" presetSubtype="0" fill="hold" nodeType="clickEffect">
+                                  <p:stCondLst>
+                                    <p:cond delay="0"/>
+                                  </p:stCondLst>
+                                  <p:childTnLst>
+                                    <p:set>
+                                      <p:cBhvr>
+                                        <p:cTn id="11" dur="1" fill="hold">
+                                          <p:stCondLst>
+                                            <p:cond delay="0"/>
+                                          </p:stCondLst>
+                                        </p:cTn>
+                                        <p:tgtEl>
+                                          <p:spTgt spid="3">
+                                            <p:txEl>
+                                              <p:pRg st="1" end="1"/>
+                                            </p:txEl>
+                                          </p:spTgt>
+                                        </p:tgtEl>
+                                        <p:attrNameLst>
+                                          <p:attrName>style.visibility</p:attrName>
+                                        </p:attrNameLst>
+                                      </p:cBhvr>
+                                      <p:to>
+                                        <p:strVal val="visible"/>
+                                      </p:to>
+                                    </p:set>
+                                    <p:animEffect transition="in" filter="fade">
+                                      <p:cBhvr>
+                                        <p:cTn id="12" dur="500"/>
+                                        <p:tgtEl>
+                                          <p:spTgt spid="3">
+                                            <p:txEl>
+                                              <p:pRg st="1" end="1"/>
+                                            </p:txEl>
+                                          </p:spTgt>
+                                        </p:tgtEl>
+                                      </p:cBhvr>
+                                    </p:animEffect>
+                                  </p:childTnLst>
+                                </p:cTn>
+                              </p:par>
+                            </p:childTnLst>
+                          </p:cTn>
+                        </p:par>
+                      </p:childTnLst>
+                    </p:cTn>
+                  </p:par>
+                </p:childTnLst>
+              </p:cTn>
+              <p:prevCondLst>
+                <p:cond evt="onPrev" delay="0">
+                  <p:tgtEl>
+                    <p:sldTgt/>
+                  </p:tgtEl>
+                </p:cond>
+              </p:prevCondLst>
+              <p:nextCondLst>
+                <p:cond evt="onNext" delay="0">
+                  <p:tgtEl>
+                    <p:sldTgt/>
+                  </p:tgtEl>
+                </p:cond>
+              </p:nextCondLst>
+            </p:seq>
+          </p:childTnLst>
+        </p:cTn>
       </p:par>
     </p:tnLst>
   </p:timing>
@@ -4155,6 +4971,283 @@
   <p:clrMapOvr>
     <a:masterClrMapping/>
   </p:clrMapOvr>
+  <p:timing>
+    <p:tnLst>
+      <p:par>
+        <p:cTn id="1" dur="indefinite" restart="never" nodeType="tmRoot">
+          <p:childTnLst>
+            <p:seq concurrent="1" nextAc="seek">
+              <p:cTn id="2" dur="indefinite" nodeType="mainSeq">
+                <p:childTnLst>
+                  <p:par>
+                    <p:cTn id="3" fill="hold">
+                      <p:stCondLst>
+                        <p:cond delay="indefinite"/>
+                        <p:cond evt="onBegin" delay="0">
+                          <p:tn val="2"/>
+                        </p:cond>
+                      </p:stCondLst>
+                      <p:childTnLst>
+                        <p:par>
+                          <p:cTn id="4" fill="hold">
+                            <p:stCondLst>
+                              <p:cond delay="0"/>
+                            </p:stCondLst>
+                            <p:childTnLst>
+                              <p:par>
+                                <p:cTn id="5" presetID="10" presetClass="entr" presetSubtype="0" fill="hold" nodeType="withEffect">
+                                  <p:stCondLst>
+                                    <p:cond delay="0"/>
+                                  </p:stCondLst>
+                                  <p:childTnLst>
+                                    <p:set>
+                                      <p:cBhvr>
+                                        <p:cTn id="6" dur="1" fill="hold">
+                                          <p:stCondLst>
+                                            <p:cond delay="0"/>
+                                          </p:stCondLst>
+                                        </p:cTn>
+                                        <p:tgtEl>
+                                          <p:spTgt spid="3">
+                                            <p:txEl>
+                                              <p:pRg st="0" end="0"/>
+                                            </p:txEl>
+                                          </p:spTgt>
+                                        </p:tgtEl>
+                                        <p:attrNameLst>
+                                          <p:attrName>style.visibility</p:attrName>
+                                        </p:attrNameLst>
+                                      </p:cBhvr>
+                                      <p:to>
+                                        <p:strVal val="visible"/>
+                                      </p:to>
+                                    </p:set>
+                                    <p:animEffect transition="in" filter="fade">
+                                      <p:cBhvr>
+                                        <p:cTn id="7" dur="500"/>
+                                        <p:tgtEl>
+                                          <p:spTgt spid="3">
+                                            <p:txEl>
+                                              <p:pRg st="0" end="0"/>
+                                            </p:txEl>
+                                          </p:spTgt>
+                                        </p:tgtEl>
+                                      </p:cBhvr>
+                                    </p:animEffect>
+                                  </p:childTnLst>
+                                </p:cTn>
+                              </p:par>
+                            </p:childTnLst>
+                          </p:cTn>
+                        </p:par>
+                      </p:childTnLst>
+                    </p:cTn>
+                  </p:par>
+                  <p:par>
+                    <p:cTn id="8" fill="hold">
+                      <p:stCondLst>
+                        <p:cond delay="indefinite"/>
+                      </p:stCondLst>
+                      <p:childTnLst>
+                        <p:par>
+                          <p:cTn id="9" fill="hold">
+                            <p:stCondLst>
+                              <p:cond delay="0"/>
+                            </p:stCondLst>
+                            <p:childTnLst>
+                              <p:par>
+                                <p:cTn id="10" presetID="10" presetClass="entr" presetSubtype="0" fill="hold" nodeType="clickEffect">
+                                  <p:stCondLst>
+                                    <p:cond delay="0"/>
+                                  </p:stCondLst>
+                                  <p:childTnLst>
+                                    <p:set>
+                                      <p:cBhvr>
+                                        <p:cTn id="11" dur="1" fill="hold">
+                                          <p:stCondLst>
+                                            <p:cond delay="0"/>
+                                          </p:stCondLst>
+                                        </p:cTn>
+                                        <p:tgtEl>
+                                          <p:spTgt spid="3">
+                                            <p:txEl>
+                                              <p:pRg st="1" end="1"/>
+                                            </p:txEl>
+                                          </p:spTgt>
+                                        </p:tgtEl>
+                                        <p:attrNameLst>
+                                          <p:attrName>style.visibility</p:attrName>
+                                        </p:attrNameLst>
+                                      </p:cBhvr>
+                                      <p:to>
+                                        <p:strVal val="visible"/>
+                                      </p:to>
+                                    </p:set>
+                                    <p:animEffect transition="in" filter="fade">
+                                      <p:cBhvr>
+                                        <p:cTn id="12" dur="500"/>
+                                        <p:tgtEl>
+                                          <p:spTgt spid="3">
+                                            <p:txEl>
+                                              <p:pRg st="1" end="1"/>
+                                            </p:txEl>
+                                          </p:spTgt>
+                                        </p:tgtEl>
+                                      </p:cBhvr>
+                                    </p:animEffect>
+                                  </p:childTnLst>
+                                </p:cTn>
+                              </p:par>
+                            </p:childTnLst>
+                          </p:cTn>
+                        </p:par>
+                      </p:childTnLst>
+                    </p:cTn>
+                  </p:par>
+                  <p:par>
+                    <p:cTn id="13" fill="hold">
+                      <p:stCondLst>
+                        <p:cond delay="indefinite"/>
+                      </p:stCondLst>
+                      <p:childTnLst>
+                        <p:par>
+                          <p:cTn id="14" fill="hold">
+                            <p:stCondLst>
+                              <p:cond delay="0"/>
+                            </p:stCondLst>
+                            <p:childTnLst>
+                              <p:par>
+                                <p:cTn id="15" presetID="10" presetClass="entr" presetSubtype="0" fill="hold" nodeType="clickEffect">
+                                  <p:stCondLst>
+                                    <p:cond delay="0"/>
+                                  </p:stCondLst>
+                                  <p:childTnLst>
+                                    <p:set>
+                                      <p:cBhvr>
+                                        <p:cTn id="16" dur="1" fill="hold">
+                                          <p:stCondLst>
+                                            <p:cond delay="0"/>
+                                          </p:stCondLst>
+                                        </p:cTn>
+                                        <p:tgtEl>
+                                          <p:spTgt spid="3">
+                                            <p:txEl>
+                                              <p:pRg st="2" end="2"/>
+                                            </p:txEl>
+                                          </p:spTgt>
+                                        </p:tgtEl>
+                                        <p:attrNameLst>
+                                          <p:attrName>style.visibility</p:attrName>
+                                        </p:attrNameLst>
+                                      </p:cBhvr>
+                                      <p:to>
+                                        <p:strVal val="visible"/>
+                                      </p:to>
+                                    </p:set>
+                                    <p:animEffect transition="in" filter="fade">
+                                      <p:cBhvr>
+                                        <p:cTn id="17" dur="500"/>
+                                        <p:tgtEl>
+                                          <p:spTgt spid="3">
+                                            <p:txEl>
+                                              <p:pRg st="2" end="2"/>
+                                            </p:txEl>
+                                          </p:spTgt>
+                                        </p:tgtEl>
+                                      </p:cBhvr>
+                                    </p:animEffect>
+                                  </p:childTnLst>
+                                </p:cTn>
+                              </p:par>
+                            </p:childTnLst>
+                          </p:cTn>
+                        </p:par>
+                      </p:childTnLst>
+                    </p:cTn>
+                  </p:par>
+                  <p:par>
+                    <p:cTn id="18" fill="hold">
+                      <p:stCondLst>
+                        <p:cond delay="indefinite"/>
+                      </p:stCondLst>
+                      <p:childTnLst>
+                        <p:par>
+                          <p:cTn id="19" fill="hold">
+                            <p:stCondLst>
+                              <p:cond delay="0"/>
+                            </p:stCondLst>
+                            <p:childTnLst>
+                              <p:par>
+                                <p:cTn id="20" presetID="10" presetClass="entr" presetSubtype="0" fill="hold" nodeType="clickEffect">
+                                  <p:stCondLst>
+                                    <p:cond delay="0"/>
+                                  </p:stCondLst>
+                                  <p:childTnLst>
+                                    <p:set>
+                                      <p:cBhvr>
+                                        <p:cTn id="21" dur="1" fill="hold">
+                                          <p:stCondLst>
+                                            <p:cond delay="0"/>
+                                          </p:stCondLst>
+                                        </p:cTn>
+                                        <p:tgtEl>
+                                          <p:spTgt spid="3">
+                                            <p:txEl>
+                                              <p:pRg st="3" end="3"/>
+                                            </p:txEl>
+                                          </p:spTgt>
+                                        </p:tgtEl>
+                                        <p:attrNameLst>
+                                          <p:attrName>style.visibility</p:attrName>
+                                        </p:attrNameLst>
+                                      </p:cBhvr>
+                                      <p:to>
+                                        <p:strVal val="visible"/>
+                                      </p:to>
+                                    </p:set>
+                                    <p:animEffect transition="in" filter="fade">
+                                      <p:cBhvr>
+                                        <p:cTn id="22" dur="500"/>
+                                        <p:tgtEl>
+                                          <p:spTgt spid="3">
+                                            <p:txEl>
+                                              <p:pRg st="3" end="3"/>
+                                            </p:txEl>
+                                          </p:spTgt>
+                                        </p:tgtEl>
+                                      </p:cBhvr>
+                                    </p:animEffect>
+                                  </p:childTnLst>
+                                </p:cTn>
+                              </p:par>
+                            </p:childTnLst>
+                          </p:cTn>
+                        </p:par>
+                      </p:childTnLst>
+                    </p:cTn>
+                  </p:par>
+                </p:childTnLst>
+              </p:cTn>
+              <p:prevCondLst>
+                <p:cond evt="onPrev" delay="0">
+                  <p:tgtEl>
+                    <p:sldTgt/>
+                  </p:tgtEl>
+                </p:cond>
+              </p:prevCondLst>
+              <p:nextCondLst>
+                <p:cond evt="onNext" delay="0">
+                  <p:tgtEl>
+                    <p:sldTgt/>
+                  </p:tgtEl>
+                </p:cond>
+              </p:nextCondLst>
+            </p:seq>
+          </p:childTnLst>
+        </p:cTn>
+      </p:par>
+    </p:tnLst>
+  </p:timing>
 </p:sld>
 </file>
 
@@ -4471,6 +5564,161 @@
   <p:clrMapOvr>
     <a:masterClrMapping/>
   </p:clrMapOvr>
+  <p:timing>
+    <p:tnLst>
+      <p:par>
+        <p:cTn id="1" dur="indefinite" restart="never" nodeType="tmRoot">
+          <p:childTnLst>
+            <p:seq concurrent="1" nextAc="seek">
+              <p:cTn id="2" dur="indefinite" nodeType="mainSeq">
+                <p:childTnLst>
+                  <p:par>
+                    <p:cTn id="3" fill="hold">
+                      <p:stCondLst>
+                        <p:cond delay="indefinite"/>
+                        <p:cond evt="onBegin" delay="0">
+                          <p:tn val="2"/>
+                        </p:cond>
+                      </p:stCondLst>
+                      <p:childTnLst>
+                        <p:par>
+                          <p:cTn id="4" fill="hold">
+                            <p:stCondLst>
+                              <p:cond delay="0"/>
+                            </p:stCondLst>
+                            <p:childTnLst>
+                              <p:par>
+                                <p:cTn id="5" presetID="10" presetClass="entr" presetSubtype="0" fill="hold" nodeType="withEffect">
+                                  <p:stCondLst>
+                                    <p:cond delay="0"/>
+                                  </p:stCondLst>
+                                  <p:childTnLst>
+                                    <p:set>
+                                      <p:cBhvr>
+                                        <p:cTn id="6" dur="1" fill="hold">
+                                          <p:stCondLst>
+                                            <p:cond delay="0"/>
+                                          </p:stCondLst>
+                                        </p:cTn>
+                                        <p:tgtEl>
+                                          <p:spTgt spid="3">
+                                            <p:txEl>
+                                              <p:pRg st="0" end="0"/>
+                                            </p:txEl>
+                                          </p:spTgt>
+                                        </p:tgtEl>
+                                        <p:attrNameLst>
+                                          <p:attrName>style.visibility</p:attrName>
+                                        </p:attrNameLst>
+                                      </p:cBhvr>
+                                      <p:to>
+                                        <p:strVal val="visible"/>
+                                      </p:to>
+                                    </p:set>
+                                    <p:animEffect transition="in" filter="fade">
+                                      <p:cBhvr>
+                                        <p:cTn id="7" dur="500"/>
+                                        <p:tgtEl>
+                                          <p:spTgt spid="3">
+                                            <p:txEl>
+                                              <p:pRg st="0" end="0"/>
+                                            </p:txEl>
+                                          </p:spTgt>
+                                        </p:tgtEl>
+                                      </p:cBhvr>
+                                    </p:animEffect>
+                                  </p:childTnLst>
+                                </p:cTn>
+                              </p:par>
+                            </p:childTnLst>
+                          </p:cTn>
+                        </p:par>
+                      </p:childTnLst>
+                    </p:cTn>
+                  </p:par>
+                  <p:par>
+                    <p:cTn id="8" fill="hold">
+                      <p:stCondLst>
+                        <p:cond delay="indefinite"/>
+                      </p:stCondLst>
+                      <p:childTnLst>
+                        <p:par>
+                          <p:cTn id="9" fill="hold">
+                            <p:stCondLst>
+                              <p:cond delay="0"/>
+                            </p:stCondLst>
+                            <p:childTnLst>
+                              <p:par>
+                                <p:cTn id="10" presetID="10" presetClass="entr" presetSubtype="0" fill="hold" nodeType="clickEffect">
+                                  <p:stCondLst>
+                                    <p:cond delay="0"/>
+                                  </p:stCondLst>
+                                  <p:childTnLst>
+                                    <p:set>
+                                      <p:cBhvr>
+                                        <p:cTn id="11" dur="1" fill="hold">
+                                          <p:stCondLst>
+                                            <p:cond delay="0"/>
+                                          </p:stCondLst>
+                                        </p:cTn>
+                                        <p:tgtEl>
+                                          <p:spTgt spid="3">
+                                            <p:txEl>
+                                              <p:pRg st="1" end="1"/>
+                                            </p:txEl>
+                                          </p:spTgt>
+                                        </p:tgtEl>
+                                        <p:attrNameLst>
+                                          <p:attrName>style.visibility</p:attrName>
+                                        </p:attrNameLst>
+                                      </p:cBhvr>
+                                      <p:to>
+                                        <p:strVal val="visible"/>
+                                      </p:to>
+                                    </p:set>
+                                    <p:animEffect transition="in" filter="fade">
+                                      <p:cBhvr>
+                                        <p:cTn id="12" dur="500"/>
+                                        <p:tgtEl>
+                                          <p:spTgt spid="3">
+                                            <p:txEl>
+                                              <p:pRg st="1" end="1"/>
+                                            </p:txEl>
+                                          </p:spTgt>
+                                        </p:tgtEl>
+                                      </p:cBhvr>
+                                    </p:animEffect>
+                                  </p:childTnLst>
+                                </p:cTn>
+                              </p:par>
+                            </p:childTnLst>
+                          </p:cTn>
+                        </p:par>
+                      </p:childTnLst>
+                    </p:cTn>
+                  </p:par>
+                </p:childTnLst>
+              </p:cTn>
+              <p:prevCondLst>
+                <p:cond evt="onPrev" delay="0">
+                  <p:tgtEl>
+                    <p:sldTgt/>
+                  </p:tgtEl>
+                </p:cond>
+              </p:prevCondLst>
+              <p:nextCondLst>
+                <p:cond evt="onNext" delay="0">
+                  <p:tgtEl>
+                    <p:sldTgt/>
+                  </p:tgtEl>
+                </p:cond>
+              </p:nextCondLst>
+            </p:seq>
+          </p:childTnLst>
+        </p:cTn>
+      </p:par>
+    </p:tnLst>
+  </p:timing>
 </p:sld>
 </file>
 
@@ -4530,6 +5778,13 @@
   <p:clrMapOvr>
     <a:masterClrMapping/>
   </p:clrMapOvr>
+  <p:timing>
+    <p:tnLst>
+      <p:par>
+        <p:cTn id="1" dur="indefinite" restart="never" nodeType="tmRoot"/>
+      </p:par>
+    </p:tnLst>
+  </p:timing>
 </p:sld>
 </file>
 
@@ -4740,6 +5995,100 @@
   <p:clrMapOvr>
     <a:masterClrMapping/>
   </p:clrMapOvr>
+  <p:timing>
+    <p:tnLst>
+      <p:par>
+        <p:cTn id="1" dur="indefinite" restart="never" nodeType="tmRoot">
+          <p:childTnLst>
+            <p:seq concurrent="1" nextAc="seek">
+              <p:cTn id="2" dur="indefinite" nodeType="mainSeq">
+                <p:childTnLst>
+                  <p:par>
+                    <p:cTn id="3" fill="hold">
+                      <p:stCondLst>
+                        <p:cond delay="indefinite"/>
+                        <p:cond evt="onBegin" delay="0">
+                          <p:tn val="2"/>
+                        </p:cond>
+                      </p:stCondLst>
+                      <p:childTnLst>
+                        <p:par>
+                          <p:cTn id="4" fill="hold">
+                            <p:stCondLst>
+                              <p:cond delay="0"/>
+                            </p:stCondLst>
+                            <p:childTnLst>
+                              <p:par>
+                                <p:cTn id="5" presetID="10" presetClass="entr" presetSubtype="0" fill="hold" nodeType="withEffect">
+                                  <p:stCondLst>
+                                    <p:cond delay="0"/>
+                                  </p:stCondLst>
+                                  <p:childTnLst>
+                                    <p:set>
+                                      <p:cBhvr>
+                                        <p:cTn id="6" dur="1" fill="hold">
+                                          <p:stCondLst>
+                                            <p:cond delay="0"/>
+                                          </p:stCondLst>
+                                        </p:cTn>
+                                        <p:tgtEl>
+                                          <p:spTgt spid="3">
+                                            <p:txEl>
+                                              <p:pRg st="0" end="0"/>
+                                            </p:txEl>
+                                          </p:spTgt>
+                                        </p:tgtEl>
+                                        <p:attrNameLst>
+                                          <p:attrName>style.visibility</p:attrName>
+                                        </p:attrNameLst>
+                                      </p:cBhvr>
+                                      <p:to>
+                                        <p:strVal val="visible"/>
+                                      </p:to>
+                                    </p:set>
+                                    <p:animEffect transition="in" filter="fade">
+                                      <p:cBhvr>
+                                        <p:cTn id="7" dur="500"/>
+                                        <p:tgtEl>
+                                          <p:spTgt spid="3">
+                                            <p:txEl>
+                                              <p:pRg st="0" end="0"/>
+                                            </p:txEl>
+                                          </p:spTgt>
+                                        </p:tgtEl>
+                                      </p:cBhvr>
+                                    </p:animEffect>
+                                  </p:childTnLst>
+                                </p:cTn>
+                              </p:par>
+                            </p:childTnLst>
+                          </p:cTn>
+                        </p:par>
+                      </p:childTnLst>
+                    </p:cTn>
+                  </p:par>
+                </p:childTnLst>
+              </p:cTn>
+              <p:prevCondLst>
+                <p:cond evt="onPrev" delay="0">
+                  <p:tgtEl>
+                    <p:sldTgt/>
+                  </p:tgtEl>
+                </p:cond>
+              </p:prevCondLst>
+              <p:nextCondLst>
+                <p:cond evt="onNext" delay="0">
+                  <p:tgtEl>
+                    <p:sldTgt/>
+                  </p:tgtEl>
+                </p:cond>
+              </p:nextCondLst>
+            </p:seq>
+          </p:childTnLst>
+        </p:cTn>
+      </p:par>
+    </p:tnLst>
+  </p:timing>
 </p:sld>
 </file>
 

</xml_diff>